<commit_message>
Update: Se modifica proyecto
</commit_message>
<xml_diff>
--- a/1- Analisis/1- Presentación/01- Presentación_Componente_Metodologico.pptx
+++ b/1- Analisis/1- Presentación/01- Presentación_Componente_Metodologico.pptx
@@ -22098,7 +22098,7 @@
         <p:push dir="r"/>
       </p:transition>
     </mc:Choice>
-    <mc:Fallback xmlns:p15="http://schemas.microsoft.com/office/powerpoint/2012/main" xmlns:com="http://schemas.openxmlformats.org/drawingml/2006/compatibility" xmlns:pvml="urn:schemas-microsoft-com:office:powerpoint" xmlns:v="urn:schemas-microsoft-com:vml" xmlns:o="urn:schemas-microsoft-com:office:office" xmlns:dgm="http://schemas.openxmlformats.org/drawingml/2006/diagram" xmlns:c="http://schemas.openxmlformats.org/drawingml/2006/chart" xmlns:mv="urn:schemas-microsoft-com:mac:vml" xmlns="">
+    <mc:Fallback xmlns="" xmlns:mv="urn:schemas-microsoft-com:mac:vml" xmlns:c="http://schemas.openxmlformats.org/drawingml/2006/chart" xmlns:dgm="http://schemas.openxmlformats.org/drawingml/2006/diagram" xmlns:o="urn:schemas-microsoft-com:office:office" xmlns:v="urn:schemas-microsoft-com:vml" xmlns:pvml="urn:schemas-microsoft-com:office:powerpoint" xmlns:com="http://schemas.openxmlformats.org/drawingml/2006/compatibility" xmlns:p15="http://schemas.microsoft.com/office/powerpoint/2012/main">
       <p:transition spd="slow">
         <p:fade/>
       </p:transition>
@@ -23657,7 +23657,7 @@
         <p:push dir="r"/>
       </p:transition>
     </mc:Choice>
-    <mc:Fallback xmlns:p15="http://schemas.microsoft.com/office/powerpoint/2012/main" xmlns:com="http://schemas.openxmlformats.org/drawingml/2006/compatibility" xmlns:pvml="urn:schemas-microsoft-com:office:powerpoint" xmlns:v="urn:schemas-microsoft-com:vml" xmlns:o="urn:schemas-microsoft-com:office:office" xmlns:dgm="http://schemas.openxmlformats.org/drawingml/2006/diagram" xmlns:c="http://schemas.openxmlformats.org/drawingml/2006/chart" xmlns:mv="urn:schemas-microsoft-com:mac:vml" xmlns="">
+    <mc:Fallback xmlns="" xmlns:mv="urn:schemas-microsoft-com:mac:vml" xmlns:c="http://schemas.openxmlformats.org/drawingml/2006/chart" xmlns:dgm="http://schemas.openxmlformats.org/drawingml/2006/diagram" xmlns:o="urn:schemas-microsoft-com:office:office" xmlns:v="urn:schemas-microsoft-com:vml" xmlns:pvml="urn:schemas-microsoft-com:office:powerpoint" xmlns:com="http://schemas.openxmlformats.org/drawingml/2006/compatibility" xmlns:p15="http://schemas.microsoft.com/office/powerpoint/2012/main">
       <p:transition spd="slow">
         <p:fade/>
       </p:transition>
@@ -25554,7 +25554,47 @@
                 <a:cs typeface="Times New Roman"/>
                 <a:sym typeface="Times New Roman"/>
               </a:rPr>
-              <a:t> Buitrago </a:t>
+              <a:t> Buitrago</a:t>
+            </a:r>
+          </a:p>
+          <a:p>
+            <a:pPr marL="457200" lvl="0" indent="-342900" algn="l" rtl="0">
+              <a:spcBef>
+                <a:spcPts val="0"/>
+              </a:spcBef>
+              <a:spcAft>
+                <a:spcPts val="0"/>
+              </a:spcAft>
+              <a:buSzPts val="1800"/>
+              <a:buFont typeface="Times New Roman"/>
+              <a:buChar char="●"/>
+            </a:pPr>
+            <a:r>
+              <a:rPr lang="es" sz="2000" dirty="0">
+                <a:latin typeface="Times New Roman"/>
+                <a:ea typeface="Times New Roman"/>
+                <a:cs typeface="Times New Roman"/>
+                <a:sym typeface="Times New Roman"/>
+              </a:rPr>
+              <a:t>Duban </a:t>
+            </a:r>
+            <a:r>
+              <a:rPr lang="es-ES" sz="2000" dirty="0">
+                <a:latin typeface="Times New Roman"/>
+                <a:ea typeface="Times New Roman"/>
+                <a:cs typeface="Times New Roman"/>
+                <a:sym typeface="Times New Roman"/>
+              </a:rPr>
+              <a:t>Andres </a:t>
+            </a:r>
+            <a:r>
+              <a:rPr lang="es-ES" sz="2000">
+                <a:latin typeface="Times New Roman"/>
+                <a:ea typeface="Times New Roman"/>
+                <a:cs typeface="Times New Roman"/>
+                <a:sym typeface="Times New Roman"/>
+              </a:rPr>
+              <a:t>Molina Bernal</a:t>
             </a:r>
             <a:endParaRPr sz="2000" dirty="0">
               <a:latin typeface="Times New Roman"/>

</xml_diff>